<commit_message>
modified image a bit
</commit_message>
<xml_diff>
--- a/SSFCfinal.pptx
+++ b/SSFCfinal.pptx
@@ -410,11 +410,11 @@
         </c:dLbls>
         <c:gapWidth val="75"/>
         <c:overlap val="-25"/>
-        <c:axId val="218310176"/>
-        <c:axId val="218312136"/>
+        <c:axId val="167273800"/>
+        <c:axId val="166999760"/>
       </c:barChart>
       <c:catAx>
-        <c:axId val="218310176"/>
+        <c:axId val="167273800"/>
         <c:scaling>
           <c:orientation val="minMax"/>
         </c:scaling>
@@ -424,7 +424,7 @@
         <c:majorTickMark val="none"/>
         <c:minorTickMark val="none"/>
         <c:tickLblPos val="nextTo"/>
-        <c:crossAx val="218312136"/>
+        <c:crossAx val="166999760"/>
         <c:crosses val="autoZero"/>
         <c:auto val="1"/>
         <c:lblAlgn val="ctr"/>
@@ -432,7 +432,7 @@
         <c:noMultiLvlLbl val="0"/>
       </c:catAx>
       <c:valAx>
-        <c:axId val="218312136"/>
+        <c:axId val="166999760"/>
         <c:scaling>
           <c:orientation val="minMax"/>
           <c:max val="200000"/>
@@ -449,7 +449,7 @@
             <a:noFill/>
           </a:ln>
         </c:spPr>
-        <c:crossAx val="218310176"/>
+        <c:crossAx val="167273800"/>
         <c:crosses val="autoZero"/>
         <c:crossBetween val="between"/>
       </c:valAx>
@@ -691,11 +691,11 @@
         </c:dLbls>
         <c:gapWidth val="75"/>
         <c:overlap val="-25"/>
-        <c:axId val="218312920"/>
-        <c:axId val="218311744"/>
+        <c:axId val="167886080"/>
+        <c:axId val="167024688"/>
       </c:barChart>
       <c:catAx>
-        <c:axId val="218312920"/>
+        <c:axId val="167886080"/>
         <c:scaling>
           <c:orientation val="minMax"/>
         </c:scaling>
@@ -705,7 +705,7 @@
         <c:majorTickMark val="none"/>
         <c:minorTickMark val="none"/>
         <c:tickLblPos val="nextTo"/>
-        <c:crossAx val="218311744"/>
+        <c:crossAx val="167024688"/>
         <c:crosses val="autoZero"/>
         <c:auto val="1"/>
         <c:lblAlgn val="ctr"/>
@@ -713,7 +713,7 @@
         <c:noMultiLvlLbl val="0"/>
       </c:catAx>
       <c:valAx>
-        <c:axId val="218311744"/>
+        <c:axId val="167024688"/>
         <c:scaling>
           <c:orientation val="minMax"/>
         </c:scaling>
@@ -729,7 +729,7 @@
             <a:noFill/>
           </a:ln>
         </c:spPr>
-        <c:crossAx val="218312920"/>
+        <c:crossAx val="167886080"/>
         <c:crosses val="autoZero"/>
         <c:crossBetween val="between"/>
       </c:valAx>
@@ -4382,7 +4382,6 @@
               <a:rPr lang="en-US" dirty="0" smtClean="0"/>
               <a:t>By </a:t>
             </a:r>
-            <a:endParaRPr lang="en-US" dirty="0" smtClean="0"/>
           </a:p>
           <a:p>
             <a:r>
@@ -4660,11 +4659,7 @@
           <a:p>
             <a:r>
               <a:rPr lang="en-US" dirty="0" smtClean="0"/>
-              <a:t>SCALABILITY</a:t>
-            </a:r>
-            <a:r>
-              <a:rPr lang="en-US" dirty="0" smtClean="0"/>
-              <a:t>	</a:t>
+              <a:t>SCALABILITY	</a:t>
             </a:r>
             <a:endParaRPr lang="en-US" dirty="0"/>
           </a:p>
@@ -4900,15 +4895,7 @@
             </a:pPr>
             <a:r>
               <a:rPr lang="en-US" sz="2800" dirty="0" smtClean="0"/>
-              <a:t>	</a:t>
-            </a:r>
-            <a:r>
-              <a:rPr lang="en-US" sz="2800" dirty="0" smtClean="0"/>
-              <a:t>devise</a:t>
-            </a:r>
-            <a:r>
-              <a:rPr lang="en-US" sz="2800" dirty="0" smtClean="0"/>
-              <a:t>, brakeman, secure headers, rack attack, code sake-dawn </a:t>
+              <a:t>	devise, brakeman, secure headers, rack attack, code sake-dawn </a:t>
             </a:r>
           </a:p>
           <a:p>
@@ -4956,13 +4943,8 @@
             </a:r>
             <a:r>
               <a:rPr lang="en-US" sz="2800" dirty="0" smtClean="0"/>
-              <a:t>	Spring </a:t>
-            </a:r>
-            <a:r>
-              <a:rPr lang="en-US" sz="2800" dirty="0" smtClean="0"/>
-              <a:t>Security</a:t>
-            </a:r>
-            <a:endParaRPr lang="en-US" sz="2800" dirty="0" smtClean="0"/>
+              <a:t>	Spring Security</a:t>
+            </a:r>
           </a:p>
           <a:p>
             <a:pPr lvl="1"/>
@@ -6211,7 +6193,7 @@
       </p:sp>
       <p:pic>
         <p:nvPicPr>
-          <p:cNvPr id="4" name="Picture 3"/>
+          <p:cNvPr id="5" name="Picture 4"/>
           <p:cNvPicPr>
             <a:picLocks noChangeAspect="1"/>
           </p:cNvPicPr>
@@ -6231,19 +6213,12 @@
         </p:blipFill>
         <p:spPr>
           <a:xfrm>
-            <a:off x="1375461" y="3863766"/>
-            <a:ext cx="5437716" cy="2142587"/>
+            <a:off x="1160586" y="3880338"/>
+            <a:ext cx="5943600" cy="1957754"/>
           </a:xfrm>
           <a:prstGeom prst="rect">
             <a:avLst/>
           </a:prstGeom>
-          <a:ln>
-            <a:solidFill>
-              <a:schemeClr val="accent1">
-                <a:lumMod val="50000"/>
-              </a:schemeClr>
-            </a:solidFill>
-          </a:ln>
         </p:spPr>
       </p:pic>
     </p:spTree>

</xml_diff>